<commit_message>
first draft of emission modeling project
</commit_message>
<xml_diff>
--- a/_site/assets/images/modeling-emission/banner.pptx
+++ b/_site/assets/images/modeling-emission/banner.pptx
@@ -243,7 +243,7 @@
           <a:p>
             <a:fld id="{A379432D-27D1-AA45-857D-D2EDAB02C904}" type="datetimeFigureOut">
               <a:rPr lang="en-US" smtClean="0"/>
-              <a:t>2/11/23</a:t>
+              <a:t>2/12/23</a:t>
             </a:fld>
             <a:endParaRPr lang="en-US"/>
           </a:p>
@@ -413,7 +413,7 @@
           <a:p>
             <a:fld id="{A379432D-27D1-AA45-857D-D2EDAB02C904}" type="datetimeFigureOut">
               <a:rPr lang="en-US" smtClean="0"/>
-              <a:t>2/11/23</a:t>
+              <a:t>2/12/23</a:t>
             </a:fld>
             <a:endParaRPr lang="en-US"/>
           </a:p>
@@ -593,7 +593,7 @@
           <a:p>
             <a:fld id="{A379432D-27D1-AA45-857D-D2EDAB02C904}" type="datetimeFigureOut">
               <a:rPr lang="en-US" smtClean="0"/>
-              <a:t>2/11/23</a:t>
+              <a:t>2/12/23</a:t>
             </a:fld>
             <a:endParaRPr lang="en-US"/>
           </a:p>
@@ -763,7 +763,7 @@
           <a:p>
             <a:fld id="{A379432D-27D1-AA45-857D-D2EDAB02C904}" type="datetimeFigureOut">
               <a:rPr lang="en-US" smtClean="0"/>
-              <a:t>2/11/23</a:t>
+              <a:t>2/12/23</a:t>
             </a:fld>
             <a:endParaRPr lang="en-US"/>
           </a:p>
@@ -1007,7 +1007,7 @@
           <a:p>
             <a:fld id="{A379432D-27D1-AA45-857D-D2EDAB02C904}" type="datetimeFigureOut">
               <a:rPr lang="en-US" smtClean="0"/>
-              <a:t>2/11/23</a:t>
+              <a:t>2/12/23</a:t>
             </a:fld>
             <a:endParaRPr lang="en-US"/>
           </a:p>
@@ -1239,7 +1239,7 @@
           <a:p>
             <a:fld id="{A379432D-27D1-AA45-857D-D2EDAB02C904}" type="datetimeFigureOut">
               <a:rPr lang="en-US" smtClean="0"/>
-              <a:t>2/11/23</a:t>
+              <a:t>2/12/23</a:t>
             </a:fld>
             <a:endParaRPr lang="en-US"/>
           </a:p>
@@ -1606,7 +1606,7 @@
           <a:p>
             <a:fld id="{A379432D-27D1-AA45-857D-D2EDAB02C904}" type="datetimeFigureOut">
               <a:rPr lang="en-US" smtClean="0"/>
-              <a:t>2/11/23</a:t>
+              <a:t>2/12/23</a:t>
             </a:fld>
             <a:endParaRPr lang="en-US"/>
           </a:p>
@@ -1724,7 +1724,7 @@
           <a:p>
             <a:fld id="{A379432D-27D1-AA45-857D-D2EDAB02C904}" type="datetimeFigureOut">
               <a:rPr lang="en-US" smtClean="0"/>
-              <a:t>2/11/23</a:t>
+              <a:t>2/12/23</a:t>
             </a:fld>
             <a:endParaRPr lang="en-US"/>
           </a:p>
@@ -1819,7 +1819,7 @@
           <a:p>
             <a:fld id="{A379432D-27D1-AA45-857D-D2EDAB02C904}" type="datetimeFigureOut">
               <a:rPr lang="en-US" smtClean="0"/>
-              <a:t>2/11/23</a:t>
+              <a:t>2/12/23</a:t>
             </a:fld>
             <a:endParaRPr lang="en-US"/>
           </a:p>
@@ -2096,7 +2096,7 @@
           <a:p>
             <a:fld id="{A379432D-27D1-AA45-857D-D2EDAB02C904}" type="datetimeFigureOut">
               <a:rPr lang="en-US" smtClean="0"/>
-              <a:t>2/11/23</a:t>
+              <a:t>2/12/23</a:t>
             </a:fld>
             <a:endParaRPr lang="en-US"/>
           </a:p>
@@ -2353,7 +2353,7 @@
           <a:p>
             <a:fld id="{A379432D-27D1-AA45-857D-D2EDAB02C904}" type="datetimeFigureOut">
               <a:rPr lang="en-US" smtClean="0"/>
-              <a:t>2/11/23</a:t>
+              <a:t>2/12/23</a:t>
             </a:fld>
             <a:endParaRPr lang="en-US"/>
           </a:p>
@@ -2566,7 +2566,7 @@
           <a:p>
             <a:fld id="{A379432D-27D1-AA45-857D-D2EDAB02C904}" type="datetimeFigureOut">
               <a:rPr lang="en-US" smtClean="0"/>
-              <a:t>2/11/23</a:t>
+              <a:t>2/12/23</a:t>
             </a:fld>
             <a:endParaRPr lang="en-US"/>
           </a:p>
@@ -2973,10 +2973,10 @@
       </p:grpSpPr>
       <p:grpSp>
         <p:nvGrpSpPr>
-          <p:cNvPr id="4" name="Group 3">
+          <p:cNvPr id="8" name="Group 7">
             <a:extLst>
               <a:ext uri="{FF2B5EF4-FFF2-40B4-BE49-F238E27FC236}">
-                <a16:creationId xmlns:a16="http://schemas.microsoft.com/office/drawing/2014/main" id="{F54B2BB5-6F58-66F8-D5FC-49E3079D63B0}"/>
+                <a16:creationId xmlns:a16="http://schemas.microsoft.com/office/drawing/2014/main" id="{23C4E590-A2DC-3FE3-BBD5-303D842DF13D}"/>
               </a:ext>
             </a:extLst>
           </p:cNvPr>
@@ -2985,175 +2985,125 @@
         </p:nvGrpSpPr>
         <p:grpSpPr>
           <a:xfrm>
-            <a:off x="-2199502" y="727392"/>
-            <a:ext cx="10082669" cy="1941667"/>
-            <a:chOff x="-2199502" y="727392"/>
-            <a:chExt cx="10082669" cy="1941667"/>
+            <a:off x="144440" y="1228434"/>
+            <a:ext cx="5197519" cy="1827918"/>
+            <a:chOff x="-1606377" y="690323"/>
+            <a:chExt cx="5197519" cy="1827918"/>
           </a:xfrm>
         </p:grpSpPr>
-        <p:grpSp>
-          <p:nvGrpSpPr>
-            <p:cNvPr id="8" name="Group 7">
+        <p:pic>
+          <p:nvPicPr>
+            <p:cNvPr id="3" name="Picture 2">
               <a:extLst>
                 <a:ext uri="{FF2B5EF4-FFF2-40B4-BE49-F238E27FC236}">
-                  <a16:creationId xmlns:a16="http://schemas.microsoft.com/office/drawing/2014/main" id="{23C4E590-A2DC-3FE3-BBD5-303D842DF13D}"/>
+                  <a16:creationId xmlns:a16="http://schemas.microsoft.com/office/drawing/2014/main" id="{BAF64338-EF94-5774-2CC1-D97C1E973B94}"/>
                 </a:ext>
               </a:extLst>
             </p:cNvPr>
-            <p:cNvGrpSpPr/>
+            <p:cNvPicPr>
+              <a:picLocks noChangeAspect="1"/>
+            </p:cNvPicPr>
             <p:nvPr/>
-          </p:nvGrpSpPr>
-          <p:grpSpPr>
-            <a:xfrm>
-              <a:off x="-2199502" y="727392"/>
-              <a:ext cx="10082669" cy="1941667"/>
-              <a:chOff x="-1606377" y="690322"/>
-              <a:chExt cx="10082669" cy="1941667"/>
-            </a:xfrm>
-          </p:grpSpPr>
-          <p:pic>
-            <p:nvPicPr>
-              <p:cNvPr id="3" name="Picture 2">
-                <a:extLst>
-                  <a:ext uri="{FF2B5EF4-FFF2-40B4-BE49-F238E27FC236}">
-                    <a16:creationId xmlns:a16="http://schemas.microsoft.com/office/drawing/2014/main" id="{BAF64338-EF94-5774-2CC1-D97C1E973B94}"/>
-                  </a:ext>
-                </a:extLst>
-              </p:cNvPr>
-              <p:cNvPicPr>
-                <a:picLocks noChangeAspect="1"/>
-              </p:cNvPicPr>
-              <p:nvPr/>
-            </p:nvPicPr>
-            <p:blipFill>
-              <a:blip r:embed="rId2"/>
-              <a:stretch>
-                <a:fillRect/>
-              </a:stretch>
-            </p:blipFill>
-            <p:spPr>
-              <a:xfrm>
-                <a:off x="-1606377" y="690322"/>
-                <a:ext cx="2743199" cy="1941667"/>
-              </a:xfrm>
-              <a:prstGeom prst="rect">
-                <a:avLst/>
-              </a:prstGeom>
-            </p:spPr>
-          </p:pic>
-          <p:pic>
-            <p:nvPicPr>
-              <p:cNvPr id="5" name="Picture 4">
-                <a:extLst>
-                  <a:ext uri="{FF2B5EF4-FFF2-40B4-BE49-F238E27FC236}">
-                    <a16:creationId xmlns:a16="http://schemas.microsoft.com/office/drawing/2014/main" id="{EF789D10-4A3F-36F4-F694-8D26F662BA0F}"/>
-                  </a:ext>
-                </a:extLst>
-              </p:cNvPr>
-              <p:cNvPicPr>
-                <a:picLocks noChangeAspect="1"/>
-              </p:cNvPicPr>
-              <p:nvPr/>
-            </p:nvPicPr>
-            <p:blipFill rotWithShape="1">
-              <a:blip r:embed="rId3"/>
-              <a:srcRect l="12940"/>
-              <a:stretch/>
-            </p:blipFill>
-            <p:spPr>
-              <a:xfrm>
-                <a:off x="1235676" y="690322"/>
-                <a:ext cx="4776464" cy="1941667"/>
-              </a:xfrm>
-              <a:prstGeom prst="rect">
-                <a:avLst/>
-              </a:prstGeom>
-            </p:spPr>
-          </p:pic>
-          <p:pic>
-            <p:nvPicPr>
-              <p:cNvPr id="7" name="Picture 6">
-                <a:extLst>
-                  <a:ext uri="{FF2B5EF4-FFF2-40B4-BE49-F238E27FC236}">
-                    <a16:creationId xmlns:a16="http://schemas.microsoft.com/office/drawing/2014/main" id="{877A8007-4C6B-8183-F072-D01F39A2CF7F}"/>
-                  </a:ext>
-                </a:extLst>
-              </p:cNvPr>
-              <p:cNvPicPr>
-                <a:picLocks noChangeAspect="1"/>
-              </p:cNvPicPr>
-              <p:nvPr/>
-            </p:nvPicPr>
-            <p:blipFill>
-              <a:blip r:embed="rId4"/>
-              <a:stretch>
-                <a:fillRect/>
-              </a:stretch>
-            </p:blipFill>
-            <p:spPr>
-              <a:xfrm>
-                <a:off x="6110994" y="690322"/>
-                <a:ext cx="2365298" cy="1941667"/>
-              </a:xfrm>
-              <a:prstGeom prst="rect">
-                <a:avLst/>
-              </a:prstGeom>
-            </p:spPr>
-          </p:pic>
-        </p:grpSp>
-        <p:sp>
-          <p:nvSpPr>
-            <p:cNvPr id="2" name="Rectangle 1">
-              <a:extLst>
-                <a:ext uri="{FF2B5EF4-FFF2-40B4-BE49-F238E27FC236}">
-                  <a16:creationId xmlns:a16="http://schemas.microsoft.com/office/drawing/2014/main" id="{E69A5A87-5CD1-EBAA-67F3-CC302824FC26}"/>
-                </a:ext>
-              </a:extLst>
-            </p:cNvPr>
-            <p:cNvSpPr/>
-            <p:nvPr/>
-          </p:nvSpPr>
+          </p:nvPicPr>
+          <p:blipFill>
+            <a:blip r:embed="rId2"/>
+            <a:stretch>
+              <a:fillRect/>
+            </a:stretch>
+          </p:blipFill>
           <p:spPr>
             <a:xfrm>
-              <a:off x="642551" y="1287380"/>
-              <a:ext cx="150395" cy="150395"/>
+              <a:off x="-1606377" y="690323"/>
+              <a:ext cx="2743199" cy="1827918"/>
             </a:xfrm>
             <a:prstGeom prst="rect">
               <a:avLst/>
             </a:prstGeom>
-            <a:solidFill>
-              <a:schemeClr val="bg1"/>
-            </a:solidFill>
-            <a:ln>
-              <a:noFill/>
-            </a:ln>
           </p:spPr>
-          <p:style>
-            <a:lnRef idx="2">
-              <a:schemeClr val="accent1">
-                <a:shade val="50000"/>
-              </a:schemeClr>
-            </a:lnRef>
-            <a:fillRef idx="1">
-              <a:schemeClr val="accent1"/>
-            </a:fillRef>
-            <a:effectRef idx="0">
-              <a:schemeClr val="accent1"/>
-            </a:effectRef>
-            <a:fontRef idx="minor">
-              <a:schemeClr val="lt1"/>
-            </a:fontRef>
-          </p:style>
-          <p:txBody>
-            <a:bodyPr rtlCol="0" anchor="ctr"/>
-            <a:lstStyle/>
-            <a:p>
-              <a:pPr algn="ctr"/>
-              <a:endParaRPr lang="en-US"/>
-            </a:p>
-          </p:txBody>
-        </p:sp>
+        </p:pic>
+        <p:pic>
+          <p:nvPicPr>
+            <p:cNvPr id="7" name="Picture 6">
+              <a:extLst>
+                <a:ext uri="{FF2B5EF4-FFF2-40B4-BE49-F238E27FC236}">
+                  <a16:creationId xmlns:a16="http://schemas.microsoft.com/office/drawing/2014/main" id="{877A8007-4C6B-8183-F072-D01F39A2CF7F}"/>
+                </a:ext>
+              </a:extLst>
+            </p:cNvPr>
+            <p:cNvPicPr>
+              <a:picLocks noChangeAspect="1"/>
+            </p:cNvPicPr>
+            <p:nvPr/>
+          </p:nvPicPr>
+          <p:blipFill>
+            <a:blip r:embed="rId3"/>
+            <a:stretch>
+              <a:fillRect/>
+            </a:stretch>
+          </p:blipFill>
+          <p:spPr>
+            <a:xfrm>
+              <a:off x="1225845" y="690323"/>
+              <a:ext cx="2365297" cy="1827918"/>
+            </a:xfrm>
+            <a:prstGeom prst="rect">
+              <a:avLst/>
+            </a:prstGeom>
+          </p:spPr>
+        </p:pic>
       </p:grpSp>
+      <p:sp>
+        <p:nvSpPr>
+          <p:cNvPr id="2" name="Rectangle 1">
+            <a:extLst>
+              <a:ext uri="{FF2B5EF4-FFF2-40B4-BE49-F238E27FC236}">
+                <a16:creationId xmlns:a16="http://schemas.microsoft.com/office/drawing/2014/main" id="{E69A5A87-5CD1-EBAA-67F3-CC302824FC26}"/>
+              </a:ext>
+            </a:extLst>
+          </p:cNvPr>
+          <p:cNvSpPr/>
+          <p:nvPr/>
+        </p:nvSpPr>
+        <p:spPr>
+          <a:xfrm>
+            <a:off x="642551" y="1287380"/>
+            <a:ext cx="150395" cy="150395"/>
+          </a:xfrm>
+          <a:prstGeom prst="rect">
+            <a:avLst/>
+          </a:prstGeom>
+          <a:solidFill>
+            <a:schemeClr val="bg1"/>
+          </a:solidFill>
+          <a:ln>
+            <a:noFill/>
+          </a:ln>
+        </p:spPr>
+        <p:style>
+          <a:lnRef idx="2">
+            <a:schemeClr val="accent1">
+              <a:shade val="50000"/>
+            </a:schemeClr>
+          </a:lnRef>
+          <a:fillRef idx="1">
+            <a:schemeClr val="accent1"/>
+          </a:fillRef>
+          <a:effectRef idx="0">
+            <a:schemeClr val="accent1"/>
+          </a:effectRef>
+          <a:fontRef idx="minor">
+            <a:schemeClr val="lt1"/>
+          </a:fontRef>
+        </p:style>
+        <p:txBody>
+          <a:bodyPr rtlCol="0" anchor="ctr"/>
+          <a:lstStyle/>
+          <a:p>
+            <a:pPr algn="ctr"/>
+            <a:endParaRPr lang="en-US"/>
+          </a:p>
+        </p:txBody>
+      </p:sp>
     </p:spTree>
     <p:extLst>
       <p:ext uri="{BB962C8B-B14F-4D97-AF65-F5344CB8AC3E}">

</xml_diff>